<commit_message>
updates to base64-encoding slides
</commit_message>
<xml_diff>
--- a/format-encodings/slide_presentations/.hidden/base64-encoding.pptx
+++ b/format-encodings/slide_presentations/.hidden/base64-encoding.pptx
@@ -850,7 +850,7 @@
         </p:nvSpPr>
         <p:spPr>
           <a:xfrm>
-            <a:off x="381300" y="685800"/>
+            <a:off x="381000" y="685800"/>
             <a:ext cx="6096000" cy="3429000"/>
           </a:xfrm>
           <a:custGeom>
@@ -1474,7 +1474,7 @@
         </p:nvSpPr>
         <p:spPr>
           <a:xfrm>
-            <a:off x="381300" y="685800"/>
+            <a:off x="381000" y="685800"/>
             <a:ext cx="6096000" cy="3429000"/>
           </a:xfrm>
           <a:custGeom>
@@ -6776,7 +6776,7 @@
         </p:spPr>
         <p:txBody>
           <a:bodyPr spcFirstLastPara="1" wrap="square" lIns="91425" tIns="91425" rIns="91425" bIns="91425" anchor="t" anchorCtr="0">
-            <a:normAutofit lnSpcReduction="10000"/>
+            <a:normAutofit fontScale="92500"/>
           </a:bodyPr>
           <a:lstStyle/>
           <a:p>
@@ -7121,7 +7121,7 @@
               <a:buNone/>
             </a:pPr>
             <a:r>
-              <a:rPr lang="en" u="sng">
+              <a:rPr lang="en" u="sng" dirty="0">
                 <a:solidFill>
                   <a:schemeClr val="hlink"/>
                 </a:solidFill>
@@ -7130,18 +7130,18 @@
               <a:t>Base64</a:t>
             </a:r>
             <a:r>
-              <a:rPr lang="en"/>
+              <a:rPr lang="en" dirty="0"/>
               <a:t>: </a:t>
             </a:r>
             <a:r>
-              <a:rPr lang="en" sz="1800">
+              <a:rPr lang="en" sz="1800" dirty="0">
                 <a:solidFill>
                   <a:schemeClr val="dk2"/>
                 </a:solidFill>
               </a:rPr>
               <a:t>a binary string is encoded as an ASCII string</a:t>
             </a:r>
-            <a:endParaRPr/>
+            <a:endParaRPr dirty="0"/>
           </a:p>
         </p:txBody>
       </p:sp>
@@ -19111,8 +19111,8 @@
         </p:nvSpPr>
         <p:spPr>
           <a:xfrm>
-            <a:off x="242574" y="1507725"/>
-            <a:ext cx="1383073" cy="384900"/>
+            <a:off x="169099" y="1507725"/>
+            <a:ext cx="1267774" cy="384900"/>
           </a:xfrm>
           <a:prstGeom prst="rect">
             <a:avLst/>
@@ -28937,6 +28937,168 @@
       </p:grpSpPr>
       <p:sp>
         <p:nvSpPr>
+          <p:cNvPr id="2" name="Rounded Rectangle 1">
+            <a:extLst>
+              <a:ext uri="{FF2B5EF4-FFF2-40B4-BE49-F238E27FC236}">
+                <a16:creationId xmlns:a16="http://schemas.microsoft.com/office/drawing/2014/main" id="{79583803-F779-CF16-4C08-C51CEF0116B3}"/>
+              </a:ext>
+            </a:extLst>
+          </p:cNvPr>
+          <p:cNvSpPr/>
+          <p:nvPr/>
+        </p:nvSpPr>
+        <p:spPr>
+          <a:xfrm>
+            <a:off x="6509500" y="3322864"/>
+            <a:ext cx="1524157" cy="481693"/>
+          </a:xfrm>
+          <a:prstGeom prst="roundRect">
+            <a:avLst/>
+          </a:prstGeom>
+          <a:pattFill prst="pct30">
+            <a:fgClr>
+              <a:srgbClr val="7030A0"/>
+            </a:fgClr>
+            <a:bgClr>
+              <a:schemeClr val="bg1"/>
+            </a:bgClr>
+          </a:pattFill>
+        </p:spPr>
+        <p:style>
+          <a:lnRef idx="2">
+            <a:schemeClr val="accent1">
+              <a:shade val="50000"/>
+            </a:schemeClr>
+          </a:lnRef>
+          <a:fillRef idx="1">
+            <a:schemeClr val="accent1"/>
+          </a:fillRef>
+          <a:effectRef idx="0">
+            <a:schemeClr val="accent1"/>
+          </a:effectRef>
+          <a:fontRef idx="minor">
+            <a:schemeClr val="lt1"/>
+          </a:fontRef>
+        </p:style>
+        <p:txBody>
+          <a:bodyPr rtlCol="0" anchor="ctr"/>
+          <a:lstStyle/>
+          <a:p>
+            <a:pPr algn="ctr"/>
+            <a:endParaRPr lang="en-US" dirty="0"/>
+          </a:p>
+        </p:txBody>
+      </p:sp>
+      <p:sp>
+        <p:nvSpPr>
+          <p:cNvPr id="3" name="Rounded Rectangle 2">
+            <a:extLst>
+              <a:ext uri="{FF2B5EF4-FFF2-40B4-BE49-F238E27FC236}">
+                <a16:creationId xmlns:a16="http://schemas.microsoft.com/office/drawing/2014/main" id="{8B9277A7-970C-C8D0-CBB6-B4A027624112}"/>
+              </a:ext>
+            </a:extLst>
+          </p:cNvPr>
+          <p:cNvSpPr/>
+          <p:nvPr/>
+        </p:nvSpPr>
+        <p:spPr>
+          <a:xfrm>
+            <a:off x="4950593" y="4383237"/>
+            <a:ext cx="1524157" cy="481693"/>
+          </a:xfrm>
+          <a:prstGeom prst="roundRect">
+            <a:avLst/>
+          </a:prstGeom>
+          <a:pattFill prst="pct30">
+            <a:fgClr>
+              <a:srgbClr val="7030A0"/>
+            </a:fgClr>
+            <a:bgClr>
+              <a:schemeClr val="bg1"/>
+            </a:bgClr>
+          </a:pattFill>
+        </p:spPr>
+        <p:style>
+          <a:lnRef idx="2">
+            <a:schemeClr val="accent1">
+              <a:shade val="50000"/>
+            </a:schemeClr>
+          </a:lnRef>
+          <a:fillRef idx="1">
+            <a:schemeClr val="accent1"/>
+          </a:fillRef>
+          <a:effectRef idx="0">
+            <a:schemeClr val="accent1"/>
+          </a:effectRef>
+          <a:fontRef idx="minor">
+            <a:schemeClr val="lt1"/>
+          </a:fontRef>
+        </p:style>
+        <p:txBody>
+          <a:bodyPr rtlCol="0" anchor="ctr"/>
+          <a:lstStyle/>
+          <a:p>
+            <a:pPr algn="ctr"/>
+            <a:endParaRPr lang="en-US" dirty="0"/>
+          </a:p>
+        </p:txBody>
+      </p:sp>
+      <p:sp>
+        <p:nvSpPr>
+          <p:cNvPr id="4" name="Rounded Rectangle 3">
+            <a:extLst>
+              <a:ext uri="{FF2B5EF4-FFF2-40B4-BE49-F238E27FC236}">
+                <a16:creationId xmlns:a16="http://schemas.microsoft.com/office/drawing/2014/main" id="{A6B5860D-2E3C-8A5A-5F50-1BE13EFDC8E8}"/>
+              </a:ext>
+            </a:extLst>
+          </p:cNvPr>
+          <p:cNvSpPr/>
+          <p:nvPr/>
+        </p:nvSpPr>
+        <p:spPr>
+          <a:xfrm>
+            <a:off x="6509500" y="4383236"/>
+            <a:ext cx="1524157" cy="481693"/>
+          </a:xfrm>
+          <a:prstGeom prst="roundRect">
+            <a:avLst/>
+          </a:prstGeom>
+          <a:pattFill prst="pct30">
+            <a:fgClr>
+              <a:srgbClr val="7030A0"/>
+            </a:fgClr>
+            <a:bgClr>
+              <a:schemeClr val="bg1"/>
+            </a:bgClr>
+          </a:pattFill>
+        </p:spPr>
+        <p:style>
+          <a:lnRef idx="2">
+            <a:schemeClr val="accent1">
+              <a:shade val="50000"/>
+            </a:schemeClr>
+          </a:lnRef>
+          <a:fillRef idx="1">
+            <a:schemeClr val="accent1"/>
+          </a:fillRef>
+          <a:effectRef idx="0">
+            <a:schemeClr val="accent1"/>
+          </a:effectRef>
+          <a:fontRef idx="minor">
+            <a:schemeClr val="lt1"/>
+          </a:fontRef>
+        </p:style>
+        <p:txBody>
+          <a:bodyPr rtlCol="0" anchor="ctr"/>
+          <a:lstStyle/>
+          <a:p>
+            <a:pPr algn="ctr"/>
+            <a:endParaRPr lang="en-US" dirty="0"/>
+          </a:p>
+        </p:txBody>
+      </p:sp>
+      <p:sp>
+        <p:nvSpPr>
           <p:cNvPr id="145" name="Google Shape;145;p20"/>
           <p:cNvSpPr txBox="1">
             <a:spLocks noGrp="1"/>
@@ -28971,10 +29133,10 @@
               <a:buChar char="●"/>
             </a:pPr>
             <a:r>
-              <a:rPr lang="en"/>
+              <a:rPr lang="en" dirty="0"/>
               <a:t>What if the size of the input is not divisible by 24 		# lcm(6,8)</a:t>
             </a:r>
-            <a:endParaRPr/>
+            <a:endParaRPr dirty="0"/>
           </a:p>
           <a:p>
             <a:pPr marL="914400" lvl="1" indent="-304165" algn="l" rtl="0">
@@ -28988,10 +29150,10 @@
               <a:buChar char="○"/>
             </a:pPr>
             <a:r>
-              <a:rPr lang="en"/>
+              <a:rPr lang="en" dirty="0"/>
               <a:t>You need to pad appropriate number of values to the right</a:t>
             </a:r>
-            <a:endParaRPr/>
+            <a:endParaRPr dirty="0"/>
           </a:p>
           <a:p>
             <a:pPr marL="457200" lvl="0" indent="-325755" algn="l" rtl="0">
@@ -29005,10 +29167,10 @@
               <a:buChar char="●"/>
             </a:pPr>
             <a:r>
-              <a:rPr lang="en"/>
+              <a:rPr lang="en" dirty="0"/>
               <a:t>Remaining 3 bytes:</a:t>
             </a:r>
-            <a:endParaRPr/>
+            <a:endParaRPr dirty="0"/>
           </a:p>
           <a:p>
             <a:pPr marL="914400" lvl="1" indent="-304165" algn="l" rtl="0">
@@ -29022,10 +29184,10 @@
               <a:buChar char="○"/>
             </a:pPr>
             <a:r>
-              <a:rPr lang="en"/>
+              <a:rPr lang="en" dirty="0"/>
               <a:t>output 4 base64 characters</a:t>
             </a:r>
-            <a:endParaRPr/>
+            <a:endParaRPr dirty="0"/>
           </a:p>
           <a:p>
             <a:pPr marL="914400" lvl="1" indent="-304165" algn="l" rtl="0">
@@ -29039,19 +29201,19 @@
               <a:buChar char="○"/>
             </a:pPr>
             <a:r>
-              <a:rPr lang="en"/>
+              <a:rPr lang="en" dirty="0"/>
               <a:t>output 0 padding character (=)</a:t>
             </a:r>
             <a:br>
-              <a:rPr lang="en"/>
+              <a:rPr lang="en" dirty="0"/>
             </a:br>
             <a:br>
-              <a:rPr lang="en"/>
+              <a:rPr lang="en" dirty="0"/>
             </a:br>
             <a:br>
-              <a:rPr lang="en"/>
+              <a:rPr lang="en" dirty="0"/>
             </a:br>
-            <a:endParaRPr/>
+            <a:endParaRPr dirty="0"/>
           </a:p>
           <a:p>
             <a:pPr marL="457200" lvl="0" indent="-325755" algn="l" rtl="0">
@@ -29065,10 +29227,10 @@
               <a:buChar char="●"/>
             </a:pPr>
             <a:r>
-              <a:rPr lang="en"/>
+              <a:rPr lang="en" dirty="0"/>
               <a:t>Remaining 2 bytes:</a:t>
             </a:r>
-            <a:endParaRPr/>
+            <a:endParaRPr dirty="0"/>
           </a:p>
           <a:p>
             <a:pPr marL="914400" lvl="1" indent="-304165" algn="l" rtl="0">
@@ -29082,10 +29244,10 @@
               <a:buChar char="○"/>
             </a:pPr>
             <a:r>
-              <a:rPr lang="en"/>
+              <a:rPr lang="en" dirty="0"/>
               <a:t>output 3 base64 characters (with two zeros as fillers)</a:t>
             </a:r>
-            <a:endParaRPr/>
+            <a:endParaRPr dirty="0"/>
           </a:p>
           <a:p>
             <a:pPr marL="914400" lvl="1" indent="-304165" algn="l" rtl="0">
@@ -29099,19 +29261,19 @@
               <a:buChar char="○"/>
             </a:pPr>
             <a:r>
-              <a:rPr lang="en"/>
+              <a:rPr lang="en" dirty="0"/>
               <a:t>output 1 padding character (=)</a:t>
             </a:r>
             <a:br>
-              <a:rPr lang="en"/>
+              <a:rPr lang="en" dirty="0"/>
             </a:br>
             <a:br>
-              <a:rPr lang="en"/>
+              <a:rPr lang="en" dirty="0"/>
             </a:br>
             <a:br>
-              <a:rPr lang="en"/>
+              <a:rPr lang="en" dirty="0"/>
             </a:br>
-            <a:endParaRPr/>
+            <a:endParaRPr dirty="0"/>
           </a:p>
           <a:p>
             <a:pPr marL="457200" lvl="0" indent="-325755" algn="l" rtl="0">
@@ -29125,10 +29287,10 @@
               <a:buChar char="●"/>
             </a:pPr>
             <a:r>
-              <a:rPr lang="en"/>
+              <a:rPr lang="en" dirty="0"/>
               <a:t>Remaining 1 byte:</a:t>
             </a:r>
-            <a:endParaRPr/>
+            <a:endParaRPr dirty="0"/>
           </a:p>
           <a:p>
             <a:pPr marL="914400" lvl="1" indent="-304165" algn="l" rtl="0">
@@ -29142,10 +29304,10 @@
               <a:buChar char="○"/>
             </a:pPr>
             <a:r>
-              <a:rPr lang="en"/>
+              <a:rPr lang="en" dirty="0"/>
               <a:t>output 2 base64 characters (with four zeros as fillers)</a:t>
             </a:r>
-            <a:endParaRPr/>
+            <a:endParaRPr dirty="0"/>
           </a:p>
           <a:p>
             <a:pPr marL="914400" lvl="1" indent="-304165" algn="l" rtl="0">
@@ -29159,10 +29321,10 @@
               <a:buChar char="○"/>
             </a:pPr>
             <a:r>
-              <a:rPr lang="en"/>
+              <a:rPr lang="en" dirty="0"/>
               <a:t>output 2 padding characters (=)</a:t>
             </a:r>
-            <a:endParaRPr/>
+            <a:endParaRPr dirty="0"/>
           </a:p>
         </p:txBody>
       </p:sp>
@@ -32096,10 +32258,10 @@
               <a:buNone/>
             </a:pPr>
             <a:r>
-              <a:rPr lang="en"/>
-              <a:t>?</a:t>
+              <a:rPr lang="en" dirty="0"/>
+              <a:t>0</a:t>
             </a:r>
-            <a:endParaRPr/>
+            <a:endParaRPr dirty="0"/>
           </a:p>
         </p:txBody>
       </p:sp>
@@ -32146,10 +32308,10 @@
               <a:buNone/>
             </a:pPr>
             <a:r>
-              <a:rPr lang="en"/>
-              <a:t>?</a:t>
+              <a:rPr lang="en" dirty="0"/>
+              <a:t>0</a:t>
             </a:r>
-            <a:endParaRPr/>
+            <a:endParaRPr dirty="0"/>
           </a:p>
         </p:txBody>
       </p:sp>
@@ -32196,10 +32358,10 @@
               <a:buNone/>
             </a:pPr>
             <a:r>
-              <a:rPr lang="en"/>
-              <a:t>?</a:t>
+              <a:rPr lang="en" dirty="0"/>
+              <a:t>0</a:t>
             </a:r>
-            <a:endParaRPr/>
+            <a:endParaRPr dirty="0"/>
           </a:p>
         </p:txBody>
       </p:sp>
@@ -32246,10 +32408,10 @@
               <a:buNone/>
             </a:pPr>
             <a:r>
-              <a:rPr lang="en"/>
-              <a:t>?</a:t>
+              <a:rPr lang="en" dirty="0"/>
+              <a:t>0</a:t>
             </a:r>
-            <a:endParaRPr/>
+            <a:endParaRPr dirty="0"/>
           </a:p>
         </p:txBody>
       </p:sp>

</xml_diff>